<commit_message>
Update colour scheme for commons
</commit_message>
<xml_diff>
--- a/docs/diagrams/FindSequenceDiagram.pptx
+++ b/docs/diagrams/FindSequenceDiagram.pptx
@@ -104,6 +104,11 @@
       </a:defRPr>
     </a:lvl9pPr>
   </p:defaultTextStyle>
+  <p:extLst>
+    <p:ext uri="{EFAFB233-063F-42B5-8137-9DF3F51BA10A}">
+      <p15:sldGuideLst xmlns:p15="http://schemas.microsoft.com/office/powerpoint/2012/main"/>
+    </p:ext>
+  </p:extLst>
 </p:presentation>
 </file>
 
@@ -254,7 +259,7 @@
           <a:p>
             <a:fld id="{585087F3-26CD-F94B-8105-DC77D072E513}" type="datetimeFigureOut">
               <a:rPr lang="en-US" smtClean="0"/>
-              <a:t>11/10/18</a:t>
+              <a:t>11/11/18</a:t>
             </a:fld>
             <a:endParaRPr lang="en-US"/>
           </a:p>
@@ -452,7 +457,7 @@
           <a:p>
             <a:fld id="{585087F3-26CD-F94B-8105-DC77D072E513}" type="datetimeFigureOut">
               <a:rPr lang="en-US" smtClean="0"/>
-              <a:t>11/10/18</a:t>
+              <a:t>11/11/18</a:t>
             </a:fld>
             <a:endParaRPr lang="en-US"/>
           </a:p>
@@ -660,7 +665,7 @@
           <a:p>
             <a:fld id="{585087F3-26CD-F94B-8105-DC77D072E513}" type="datetimeFigureOut">
               <a:rPr lang="en-US" smtClean="0"/>
-              <a:t>11/10/18</a:t>
+              <a:t>11/11/18</a:t>
             </a:fld>
             <a:endParaRPr lang="en-US"/>
           </a:p>
@@ -858,7 +863,7 @@
           <a:p>
             <a:fld id="{585087F3-26CD-F94B-8105-DC77D072E513}" type="datetimeFigureOut">
               <a:rPr lang="en-US" smtClean="0"/>
-              <a:t>11/10/18</a:t>
+              <a:t>11/11/18</a:t>
             </a:fld>
             <a:endParaRPr lang="en-US"/>
           </a:p>
@@ -1133,7 +1138,7 @@
           <a:p>
             <a:fld id="{585087F3-26CD-F94B-8105-DC77D072E513}" type="datetimeFigureOut">
               <a:rPr lang="en-US" smtClean="0"/>
-              <a:t>11/10/18</a:t>
+              <a:t>11/11/18</a:t>
             </a:fld>
             <a:endParaRPr lang="en-US"/>
           </a:p>
@@ -1398,7 +1403,7 @@
           <a:p>
             <a:fld id="{585087F3-26CD-F94B-8105-DC77D072E513}" type="datetimeFigureOut">
               <a:rPr lang="en-US" smtClean="0"/>
-              <a:t>11/10/18</a:t>
+              <a:t>11/11/18</a:t>
             </a:fld>
             <a:endParaRPr lang="en-US"/>
           </a:p>
@@ -1810,7 +1815,7 @@
           <a:p>
             <a:fld id="{585087F3-26CD-F94B-8105-DC77D072E513}" type="datetimeFigureOut">
               <a:rPr lang="en-US" smtClean="0"/>
-              <a:t>11/10/18</a:t>
+              <a:t>11/11/18</a:t>
             </a:fld>
             <a:endParaRPr lang="en-US"/>
           </a:p>
@@ -1951,7 +1956,7 @@
           <a:p>
             <a:fld id="{585087F3-26CD-F94B-8105-DC77D072E513}" type="datetimeFigureOut">
               <a:rPr lang="en-US" smtClean="0"/>
-              <a:t>11/10/18</a:t>
+              <a:t>11/11/18</a:t>
             </a:fld>
             <a:endParaRPr lang="en-US"/>
           </a:p>
@@ -2064,7 +2069,7 @@
           <a:p>
             <a:fld id="{585087F3-26CD-F94B-8105-DC77D072E513}" type="datetimeFigureOut">
               <a:rPr lang="en-US" smtClean="0"/>
-              <a:t>11/10/18</a:t>
+              <a:t>11/11/18</a:t>
             </a:fld>
             <a:endParaRPr lang="en-US"/>
           </a:p>
@@ -2375,7 +2380,7 @@
           <a:p>
             <a:fld id="{585087F3-26CD-F94B-8105-DC77D072E513}" type="datetimeFigureOut">
               <a:rPr lang="en-US" smtClean="0"/>
-              <a:t>11/10/18</a:t>
+              <a:t>11/11/18</a:t>
             </a:fld>
             <a:endParaRPr lang="en-US"/>
           </a:p>
@@ -2663,7 +2668,7 @@
           <a:p>
             <a:fld id="{585087F3-26CD-F94B-8105-DC77D072E513}" type="datetimeFigureOut">
               <a:rPr lang="en-US" smtClean="0"/>
-              <a:t>11/10/18</a:t>
+              <a:t>11/11/18</a:t>
             </a:fld>
             <a:endParaRPr lang="en-US"/>
           </a:p>
@@ -2904,7 +2909,7 @@
           <a:p>
             <a:fld id="{585087F3-26CD-F94B-8105-DC77D072E513}" type="datetimeFigureOut">
               <a:rPr lang="en-US" smtClean="0"/>
-              <a:t>11/10/18</a:t>
+              <a:t>11/11/18</a:t>
             </a:fld>
             <a:endParaRPr lang="en-US"/>
           </a:p>
@@ -3411,10 +3416,9 @@
             </a:avLst>
           </a:prstGeom>
           <a:solidFill>
-            <a:schemeClr val="accent2">
-              <a:lumMod val="20000"/>
-              <a:lumOff val="80000"/>
-            </a:schemeClr>
+            <a:srgbClr val="30869C">
+              <a:alpha val="38824"/>
+            </a:srgbClr>
           </a:solidFill>
           <a:ln w="19050">
             <a:noFill/>
@@ -3442,14 +3446,14 @@
             <a:r>
               <a:rPr lang="en-US" sz="1200" b="1" dirty="0">
                 <a:solidFill>
-                  <a:schemeClr val="accent2"/>
+                  <a:srgbClr val="30869C"/>
                 </a:solidFill>
               </a:rPr>
               <a:t>Common</a:t>
             </a:r>
             <a:endParaRPr lang="en-SG" sz="1200" b="1" dirty="0">
               <a:solidFill>
-                <a:schemeClr val="accent2"/>
+                <a:srgbClr val="30869C"/>
               </a:solidFill>
             </a:endParaRPr>
           </a:p>
@@ -5324,11 +5328,11 @@
             <a:avLst/>
           </a:prstGeom>
           <a:solidFill>
-            <a:schemeClr val="accent2"/>
+            <a:srgbClr val="30869C"/>
           </a:solidFill>
           <a:ln>
             <a:solidFill>
-              <a:schemeClr val="accent2"/>
+              <a:srgbClr val="30869C"/>
             </a:solidFill>
           </a:ln>
         </p:spPr>
@@ -5389,7 +5393,7 @@
           </a:prstGeom>
           <a:ln w="19050">
             <a:solidFill>
-              <a:schemeClr val="accent2"/>
+              <a:srgbClr val="30869C"/>
             </a:solidFill>
             <a:prstDash val="sysDash"/>
           </a:ln>
@@ -5431,11 +5435,11 @@
             <a:avLst/>
           </a:prstGeom>
           <a:solidFill>
-            <a:schemeClr val="accent2"/>
+            <a:srgbClr val="30869C"/>
           </a:solidFill>
           <a:ln>
             <a:solidFill>
-              <a:schemeClr val="accent2"/>
+              <a:srgbClr val="30869C"/>
             </a:solidFill>
           </a:ln>
         </p:spPr>
@@ -5478,13 +5482,16 @@
         </p:nvSpPr>
         <p:spPr>
           <a:xfrm>
-            <a:off x="8246304" y="4947693"/>
+            <a:off x="8464747" y="4924290"/>
             <a:ext cx="1338532" cy="215444"/>
           </a:xfrm>
           <a:prstGeom prst="rect">
             <a:avLst/>
           </a:prstGeom>
           <a:noFill/>
+          <a:ln>
+            <a:noFill/>
+          </a:ln>
         </p:spPr>
         <p:txBody>
           <a:bodyPr wrap="square" lIns="0" tIns="0" rIns="0" bIns="0" rtlCol="0">
@@ -5507,10 +5514,26 @@
             <a:r>
               <a:rPr lang="en-US" dirty="0">
                 <a:solidFill>
-                  <a:schemeClr val="accent2"/>
+                  <a:srgbClr val="30869C"/>
                 </a:solidFill>
               </a:rPr>
-              <a:t>post(event)</a:t>
+              <a:t>post(</a:t>
+            </a:r>
+            <a:r>
+              <a:rPr lang="en-US" dirty="0" err="1">
+                <a:solidFill>
+                  <a:srgbClr val="30869C"/>
+                </a:solidFill>
+              </a:rPr>
+              <a:t>FindEvent</a:t>
+            </a:r>
+            <a:r>
+              <a:rPr lang="en-US" dirty="0">
+                <a:solidFill>
+                  <a:srgbClr val="30869C"/>
+                </a:solidFill>
+              </a:rPr>
+              <a:t>)</a:t>
             </a:r>
           </a:p>
         </p:txBody>
@@ -5539,7 +5562,7 @@
           </a:prstGeom>
           <a:ln w="19050">
             <a:solidFill>
-              <a:schemeClr val="accent2"/>
+              <a:srgbClr val="30869C"/>
             </a:solidFill>
             <a:tailEnd type="arrow"/>
           </a:ln>
@@ -5573,8 +5596,8 @@
         </p:nvSpPr>
         <p:spPr>
           <a:xfrm>
-            <a:off x="6666714" y="4673680"/>
-            <a:ext cx="613241" cy="215444"/>
+            <a:off x="6358050" y="4634183"/>
+            <a:ext cx="1550171" cy="215444"/>
           </a:xfrm>
           <a:prstGeom prst="rect">
             <a:avLst/>
@@ -5599,8 +5622,12 @@
           </a:lstStyle>
           <a:p>
             <a:r>
+              <a:rPr lang="en-US" dirty="0" err="1"/>
+              <a:t>FindEvent</a:t>
+            </a:r>
+            <a:r>
               <a:rPr lang="en-US" dirty="0"/>
-              <a:t>CS1010</a:t>
+              <a:t>(CS1010)</a:t>
             </a:r>
           </a:p>
         </p:txBody>

</xml_diff>